<commit_message>
Criação do site ASP
</commit_message>
<xml_diff>
--- a/Rascunhos/imagens para HIV.pptx
+++ b/Rascunhos/imagens para HIV.pptx
@@ -3331,54 +3331,6 @@
           <a:chExt cx="0" cy="0"/>
         </a:xfrm>
       </p:grpSpPr>
-      <p:sp>
-        <p:nvSpPr>
-          <p:cNvPr id="2" name="Elipse 1"/>
-          <p:cNvSpPr/>
-          <p:nvPr/>
-        </p:nvSpPr>
-        <p:spPr>
-          <a:xfrm>
-            <a:off x="5567266" y="1454353"/>
-            <a:ext cx="3191067" cy="3335566"/>
-          </a:xfrm>
-          <a:prstGeom prst="ellipse">
-            <a:avLst/>
-          </a:prstGeom>
-          <a:solidFill>
-            <a:srgbClr val="7030A0"/>
-          </a:solidFill>
-          <a:ln w="57150">
-            <a:solidFill>
-              <a:srgbClr val="5F2480"/>
-            </a:solidFill>
-          </a:ln>
-        </p:spPr>
-        <p:style>
-          <a:lnRef idx="2">
-            <a:schemeClr val="accent1">
-              <a:shade val="50000"/>
-            </a:schemeClr>
-          </a:lnRef>
-          <a:fillRef idx="1">
-            <a:schemeClr val="accent1"/>
-          </a:fillRef>
-          <a:effectRef idx="0">
-            <a:schemeClr val="accent1"/>
-          </a:effectRef>
-          <a:fontRef idx="minor">
-            <a:schemeClr val="lt1"/>
-          </a:fontRef>
-        </p:style>
-        <p:txBody>
-          <a:bodyPr rtlCol="0" anchor="ctr"/>
-          <a:lstStyle/>
-          <a:p>
-            <a:pPr algn="ctr"/>
-            <a:endParaRPr lang="pt-BR"/>
-          </a:p>
-        </p:txBody>
-      </p:sp>
       <p:pic>
         <p:nvPicPr>
           <p:cNvPr id="1026" name="Picture 2"/>
@@ -3433,6 +3385,1558 @@
           </a:extLst>
         </p:spPr>
       </p:pic>
+      <p:grpSp>
+        <p:nvGrpSpPr>
+          <p:cNvPr id="58" name="Grupo 57"/>
+          <p:cNvGrpSpPr/>
+          <p:nvPr/>
+        </p:nvGrpSpPr>
+        <p:grpSpPr>
+          <a:xfrm>
+            <a:off x="5150568" y="1909667"/>
+            <a:ext cx="2536517" cy="2596323"/>
+            <a:chOff x="6497209" y="1638481"/>
+            <a:chExt cx="2536517" cy="2596323"/>
+          </a:xfrm>
+        </p:grpSpPr>
+        <p:grpSp>
+          <p:nvGrpSpPr>
+            <p:cNvPr id="54" name="Grupo 53"/>
+            <p:cNvGrpSpPr/>
+            <p:nvPr/>
+          </p:nvGrpSpPr>
+          <p:grpSpPr>
+            <a:xfrm>
+              <a:off x="6580533" y="1706470"/>
+              <a:ext cx="2387141" cy="2473360"/>
+              <a:chOff x="5796843" y="1593055"/>
+              <a:chExt cx="2387141" cy="2473360"/>
+            </a:xfrm>
+          </p:grpSpPr>
+          <p:sp>
+            <p:nvSpPr>
+              <p:cNvPr id="2" name="Elipse 1"/>
+              <p:cNvSpPr/>
+              <p:nvPr/>
+            </p:nvSpPr>
+            <p:spPr>
+              <a:xfrm>
+                <a:off x="5995892" y="1790002"/>
+                <a:ext cx="1986058" cy="2075991"/>
+              </a:xfrm>
+              <a:prstGeom prst="ellipse">
+                <a:avLst/>
+              </a:prstGeom>
+              <a:solidFill>
+                <a:srgbClr val="7030A0"/>
+              </a:solidFill>
+              <a:ln w="57150">
+                <a:noFill/>
+              </a:ln>
+            </p:spPr>
+            <p:style>
+              <a:lnRef idx="2">
+                <a:schemeClr val="accent1">
+                  <a:shade val="50000"/>
+                </a:schemeClr>
+              </a:lnRef>
+              <a:fillRef idx="1">
+                <a:schemeClr val="accent1"/>
+              </a:fillRef>
+              <a:effectRef idx="0">
+                <a:schemeClr val="accent1"/>
+              </a:effectRef>
+              <a:fontRef idx="minor">
+                <a:schemeClr val="lt1"/>
+              </a:fontRef>
+            </p:style>
+            <p:txBody>
+              <a:bodyPr rtlCol="0" anchor="ctr"/>
+              <a:lstStyle/>
+              <a:p>
+                <a:pPr algn="ctr"/>
+                <a:endParaRPr lang="pt-BR"/>
+              </a:p>
+            </p:txBody>
+          </p:sp>
+          <p:sp>
+            <p:nvSpPr>
+              <p:cNvPr id="21" name="Retângulo 20"/>
+              <p:cNvSpPr/>
+              <p:nvPr/>
+            </p:nvSpPr>
+            <p:spPr>
+              <a:xfrm>
+                <a:off x="6882955" y="1593055"/>
+                <a:ext cx="211931" cy="352425"/>
+              </a:xfrm>
+              <a:prstGeom prst="rect">
+                <a:avLst/>
+              </a:prstGeom>
+              <a:solidFill>
+                <a:srgbClr val="7030A0"/>
+              </a:solidFill>
+              <a:ln>
+                <a:noFill/>
+              </a:ln>
+            </p:spPr>
+            <p:style>
+              <a:lnRef idx="2">
+                <a:schemeClr val="accent1">
+                  <a:shade val="50000"/>
+                </a:schemeClr>
+              </a:lnRef>
+              <a:fillRef idx="1">
+                <a:schemeClr val="accent1"/>
+              </a:fillRef>
+              <a:effectRef idx="0">
+                <a:schemeClr val="accent1"/>
+              </a:effectRef>
+              <a:fontRef idx="minor">
+                <a:schemeClr val="lt1"/>
+              </a:fontRef>
+            </p:style>
+            <p:txBody>
+              <a:bodyPr rtlCol="0" anchor="ctr"/>
+              <a:lstStyle/>
+              <a:p>
+                <a:pPr algn="ctr"/>
+                <a:endParaRPr lang="pt-BR"/>
+              </a:p>
+            </p:txBody>
+          </p:sp>
+          <p:sp>
+            <p:nvSpPr>
+              <p:cNvPr id="28" name="Retângulo 27"/>
+              <p:cNvSpPr/>
+              <p:nvPr/>
+            </p:nvSpPr>
+            <p:spPr>
+              <a:xfrm rot="2700000">
+                <a:off x="7612487" y="1901432"/>
+                <a:ext cx="211931" cy="352425"/>
+              </a:xfrm>
+              <a:prstGeom prst="rect">
+                <a:avLst/>
+              </a:prstGeom>
+              <a:solidFill>
+                <a:srgbClr val="7030A0"/>
+              </a:solidFill>
+              <a:ln>
+                <a:noFill/>
+              </a:ln>
+            </p:spPr>
+            <p:style>
+              <a:lnRef idx="2">
+                <a:schemeClr val="accent1">
+                  <a:shade val="50000"/>
+                </a:schemeClr>
+              </a:lnRef>
+              <a:fillRef idx="1">
+                <a:schemeClr val="accent1"/>
+              </a:fillRef>
+              <a:effectRef idx="0">
+                <a:schemeClr val="accent1"/>
+              </a:effectRef>
+              <a:fontRef idx="minor">
+                <a:schemeClr val="lt1"/>
+              </a:fontRef>
+            </p:style>
+            <p:txBody>
+              <a:bodyPr rtlCol="0" anchor="ctr"/>
+              <a:lstStyle/>
+              <a:p>
+                <a:pPr algn="ctr"/>
+                <a:endParaRPr lang="pt-BR"/>
+              </a:p>
+            </p:txBody>
+          </p:sp>
+          <p:sp>
+            <p:nvSpPr>
+              <p:cNvPr id="31" name="Retângulo 30"/>
+              <p:cNvSpPr/>
+              <p:nvPr/>
+            </p:nvSpPr>
+            <p:spPr>
+              <a:xfrm rot="5400000">
+                <a:off x="7901806" y="2651785"/>
+                <a:ext cx="211931" cy="352425"/>
+              </a:xfrm>
+              <a:prstGeom prst="rect">
+                <a:avLst/>
+              </a:prstGeom>
+              <a:solidFill>
+                <a:srgbClr val="7030A0"/>
+              </a:solidFill>
+              <a:ln>
+                <a:noFill/>
+              </a:ln>
+            </p:spPr>
+            <p:style>
+              <a:lnRef idx="2">
+                <a:schemeClr val="accent1">
+                  <a:shade val="50000"/>
+                </a:schemeClr>
+              </a:lnRef>
+              <a:fillRef idx="1">
+                <a:schemeClr val="accent1"/>
+              </a:fillRef>
+              <a:effectRef idx="0">
+                <a:schemeClr val="accent1"/>
+              </a:effectRef>
+              <a:fontRef idx="minor">
+                <a:schemeClr val="lt1"/>
+              </a:fontRef>
+            </p:style>
+            <p:txBody>
+              <a:bodyPr rtlCol="0" anchor="ctr"/>
+              <a:lstStyle/>
+              <a:p>
+                <a:pPr algn="ctr"/>
+                <a:endParaRPr lang="pt-BR"/>
+              </a:p>
+            </p:txBody>
+          </p:sp>
+          <p:sp>
+            <p:nvSpPr>
+              <p:cNvPr id="34" name="Retângulo 33"/>
+              <p:cNvSpPr/>
+              <p:nvPr/>
+            </p:nvSpPr>
+            <p:spPr>
+              <a:xfrm rot="16200000">
+                <a:off x="5867090" y="2651785"/>
+                <a:ext cx="211931" cy="352425"/>
+              </a:xfrm>
+              <a:prstGeom prst="rect">
+                <a:avLst/>
+              </a:prstGeom>
+              <a:solidFill>
+                <a:srgbClr val="7030A0"/>
+              </a:solidFill>
+              <a:ln>
+                <a:noFill/>
+              </a:ln>
+            </p:spPr>
+            <p:style>
+              <a:lnRef idx="2">
+                <a:schemeClr val="accent1">
+                  <a:shade val="50000"/>
+                </a:schemeClr>
+              </a:lnRef>
+              <a:fillRef idx="1">
+                <a:schemeClr val="accent1"/>
+              </a:fillRef>
+              <a:effectRef idx="0">
+                <a:schemeClr val="accent1"/>
+              </a:effectRef>
+              <a:fontRef idx="minor">
+                <a:schemeClr val="lt1"/>
+              </a:fontRef>
+            </p:style>
+            <p:txBody>
+              <a:bodyPr rtlCol="0" anchor="ctr"/>
+              <a:lstStyle/>
+              <a:p>
+                <a:pPr algn="ctr"/>
+                <a:endParaRPr lang="pt-BR"/>
+              </a:p>
+            </p:txBody>
+          </p:sp>
+          <p:sp>
+            <p:nvSpPr>
+              <p:cNvPr id="37" name="Retângulo 36"/>
+              <p:cNvSpPr/>
+              <p:nvPr/>
+            </p:nvSpPr>
+            <p:spPr>
+              <a:xfrm rot="10800000">
+                <a:off x="6882955" y="3713990"/>
+                <a:ext cx="211931" cy="352425"/>
+              </a:xfrm>
+              <a:prstGeom prst="rect">
+                <a:avLst/>
+              </a:prstGeom>
+              <a:solidFill>
+                <a:srgbClr val="7030A0"/>
+              </a:solidFill>
+              <a:ln>
+                <a:noFill/>
+              </a:ln>
+            </p:spPr>
+            <p:style>
+              <a:lnRef idx="2">
+                <a:schemeClr val="accent1">
+                  <a:shade val="50000"/>
+                </a:schemeClr>
+              </a:lnRef>
+              <a:fillRef idx="1">
+                <a:schemeClr val="accent1"/>
+              </a:fillRef>
+              <a:effectRef idx="0">
+                <a:schemeClr val="accent1"/>
+              </a:effectRef>
+              <a:fontRef idx="minor">
+                <a:schemeClr val="lt1"/>
+              </a:fontRef>
+            </p:style>
+            <p:txBody>
+              <a:bodyPr rtlCol="0" anchor="ctr"/>
+              <a:lstStyle/>
+              <a:p>
+                <a:pPr algn="ctr"/>
+                <a:endParaRPr lang="pt-BR"/>
+              </a:p>
+            </p:txBody>
+          </p:sp>
+          <p:sp>
+            <p:nvSpPr>
+              <p:cNvPr id="40" name="Retângulo 39"/>
+              <p:cNvSpPr/>
+              <p:nvPr/>
+            </p:nvSpPr>
+            <p:spPr>
+              <a:xfrm rot="18900000">
+                <a:off x="6132234" y="1915315"/>
+                <a:ext cx="211931" cy="352425"/>
+              </a:xfrm>
+              <a:prstGeom prst="rect">
+                <a:avLst/>
+              </a:prstGeom>
+              <a:solidFill>
+                <a:srgbClr val="7030A0"/>
+              </a:solidFill>
+              <a:ln>
+                <a:noFill/>
+              </a:ln>
+            </p:spPr>
+            <p:style>
+              <a:lnRef idx="2">
+                <a:schemeClr val="accent1">
+                  <a:shade val="50000"/>
+                </a:schemeClr>
+              </a:lnRef>
+              <a:fillRef idx="1">
+                <a:schemeClr val="accent1"/>
+              </a:fillRef>
+              <a:effectRef idx="0">
+                <a:schemeClr val="accent1"/>
+              </a:effectRef>
+              <a:fontRef idx="minor">
+                <a:schemeClr val="lt1"/>
+              </a:fontRef>
+            </p:style>
+            <p:txBody>
+              <a:bodyPr rtlCol="0" anchor="ctr"/>
+              <a:lstStyle/>
+              <a:p>
+                <a:pPr algn="ctr"/>
+                <a:endParaRPr lang="pt-BR"/>
+              </a:p>
+            </p:txBody>
+          </p:sp>
+          <p:sp>
+            <p:nvSpPr>
+              <p:cNvPr id="43" name="Retângulo 42"/>
+              <p:cNvSpPr/>
+              <p:nvPr/>
+            </p:nvSpPr>
+            <p:spPr>
+              <a:xfrm rot="8100000">
+                <a:off x="7630071" y="3374999"/>
+                <a:ext cx="211931" cy="352425"/>
+              </a:xfrm>
+              <a:prstGeom prst="rect">
+                <a:avLst/>
+              </a:prstGeom>
+              <a:solidFill>
+                <a:srgbClr val="7030A0"/>
+              </a:solidFill>
+              <a:ln>
+                <a:noFill/>
+              </a:ln>
+            </p:spPr>
+            <p:style>
+              <a:lnRef idx="2">
+                <a:schemeClr val="accent1">
+                  <a:shade val="50000"/>
+                </a:schemeClr>
+              </a:lnRef>
+              <a:fillRef idx="1">
+                <a:schemeClr val="accent1"/>
+              </a:fillRef>
+              <a:effectRef idx="0">
+                <a:schemeClr val="accent1"/>
+              </a:effectRef>
+              <a:fontRef idx="minor">
+                <a:schemeClr val="lt1"/>
+              </a:fontRef>
+            </p:style>
+            <p:txBody>
+              <a:bodyPr rtlCol="0" anchor="ctr"/>
+              <a:lstStyle/>
+              <a:p>
+                <a:pPr algn="ctr"/>
+                <a:endParaRPr lang="pt-BR"/>
+              </a:p>
+            </p:txBody>
+          </p:sp>
+          <p:sp>
+            <p:nvSpPr>
+              <p:cNvPr id="46" name="Retângulo 45"/>
+              <p:cNvSpPr/>
+              <p:nvPr/>
+            </p:nvSpPr>
+            <p:spPr>
+              <a:xfrm rot="13500000">
+                <a:off x="6160131" y="3403239"/>
+                <a:ext cx="211931" cy="352425"/>
+              </a:xfrm>
+              <a:prstGeom prst="rect">
+                <a:avLst/>
+              </a:prstGeom>
+              <a:solidFill>
+                <a:srgbClr val="7030A0"/>
+              </a:solidFill>
+              <a:ln>
+                <a:noFill/>
+              </a:ln>
+            </p:spPr>
+            <p:style>
+              <a:lnRef idx="2">
+                <a:schemeClr val="accent1">
+                  <a:shade val="50000"/>
+                </a:schemeClr>
+              </a:lnRef>
+              <a:fillRef idx="1">
+                <a:schemeClr val="accent1"/>
+              </a:fillRef>
+              <a:effectRef idx="0">
+                <a:schemeClr val="accent1"/>
+              </a:effectRef>
+              <a:fontRef idx="minor">
+                <a:schemeClr val="lt1"/>
+              </a:fontRef>
+            </p:style>
+            <p:txBody>
+              <a:bodyPr rtlCol="0" anchor="ctr"/>
+              <a:lstStyle/>
+              <a:p>
+                <a:pPr algn="ctr"/>
+                <a:endParaRPr lang="pt-BR"/>
+              </a:p>
+            </p:txBody>
+          </p:sp>
+          <p:sp>
+            <p:nvSpPr>
+              <p:cNvPr id="48" name="Elipse 47"/>
+              <p:cNvSpPr/>
+              <p:nvPr/>
+            </p:nvSpPr>
+            <p:spPr>
+              <a:xfrm>
+                <a:off x="6134892" y="1935295"/>
+                <a:ext cx="1708058" cy="1785403"/>
+              </a:xfrm>
+              <a:prstGeom prst="ellipse">
+                <a:avLst/>
+              </a:prstGeom>
+              <a:solidFill>
+                <a:srgbClr val="F69C9C"/>
+              </a:solidFill>
+              <a:ln w="57150">
+                <a:noFill/>
+              </a:ln>
+            </p:spPr>
+            <p:style>
+              <a:lnRef idx="2">
+                <a:schemeClr val="accent1">
+                  <a:shade val="50000"/>
+                </a:schemeClr>
+              </a:lnRef>
+              <a:fillRef idx="1">
+                <a:schemeClr val="accent1"/>
+              </a:fillRef>
+              <a:effectRef idx="0">
+                <a:schemeClr val="accent1"/>
+              </a:effectRef>
+              <a:fontRef idx="minor">
+                <a:schemeClr val="lt1"/>
+              </a:fontRef>
+            </p:style>
+            <p:txBody>
+              <a:bodyPr rtlCol="0" anchor="ctr"/>
+              <a:lstStyle/>
+              <a:p>
+                <a:pPr algn="ctr"/>
+                <a:endParaRPr lang="pt-BR"/>
+              </a:p>
+            </p:txBody>
+          </p:sp>
+          <p:sp>
+            <p:nvSpPr>
+              <p:cNvPr id="49" name="Elipse 48"/>
+              <p:cNvSpPr/>
+              <p:nvPr/>
+            </p:nvSpPr>
+            <p:spPr>
+              <a:xfrm>
+                <a:off x="6230334" y="2035060"/>
+                <a:ext cx="1517172" cy="1585873"/>
+              </a:xfrm>
+              <a:prstGeom prst="ellipse">
+                <a:avLst/>
+              </a:prstGeom>
+              <a:solidFill>
+                <a:schemeClr val="accent1">
+                  <a:lumMod val="60000"/>
+                  <a:lumOff val="40000"/>
+                </a:schemeClr>
+              </a:solidFill>
+              <a:ln w="57150">
+                <a:noFill/>
+              </a:ln>
+            </p:spPr>
+            <p:style>
+              <a:lnRef idx="2">
+                <a:schemeClr val="accent1">
+                  <a:shade val="50000"/>
+                </a:schemeClr>
+              </a:lnRef>
+              <a:fillRef idx="1">
+                <a:schemeClr val="accent1"/>
+              </a:fillRef>
+              <a:effectRef idx="0">
+                <a:schemeClr val="accent1"/>
+              </a:effectRef>
+              <a:fontRef idx="minor">
+                <a:schemeClr val="lt1"/>
+              </a:fontRef>
+            </p:style>
+            <p:txBody>
+              <a:bodyPr rtlCol="0" anchor="ctr"/>
+              <a:lstStyle/>
+              <a:p>
+                <a:pPr algn="ctr"/>
+                <a:endParaRPr lang="pt-BR"/>
+              </a:p>
+            </p:txBody>
+          </p:sp>
+          <p:sp>
+            <p:nvSpPr>
+              <p:cNvPr id="50" name="Elipse 49"/>
+              <p:cNvSpPr/>
+              <p:nvPr/>
+            </p:nvSpPr>
+            <p:spPr>
+              <a:xfrm>
+                <a:off x="6563471" y="2202156"/>
+                <a:ext cx="850900" cy="1251682"/>
+              </a:xfrm>
+              <a:prstGeom prst="ellipse">
+                <a:avLst/>
+              </a:prstGeom>
+              <a:solidFill>
+                <a:schemeClr val="accent1">
+                  <a:lumMod val="50000"/>
+                </a:schemeClr>
+              </a:solidFill>
+              <a:ln>
+                <a:noFill/>
+              </a:ln>
+            </p:spPr>
+            <p:style>
+              <a:lnRef idx="2">
+                <a:schemeClr val="accent1">
+                  <a:shade val="50000"/>
+                </a:schemeClr>
+              </a:lnRef>
+              <a:fillRef idx="1">
+                <a:schemeClr val="accent1"/>
+              </a:fillRef>
+              <a:effectRef idx="0">
+                <a:schemeClr val="accent1"/>
+              </a:effectRef>
+              <a:fontRef idx="minor">
+                <a:schemeClr val="lt1"/>
+              </a:fontRef>
+            </p:style>
+            <p:txBody>
+              <a:bodyPr rtlCol="0" anchor="ctr"/>
+              <a:lstStyle/>
+              <a:p>
+                <a:pPr algn="ctr"/>
+                <a:endParaRPr lang="pt-BR"/>
+              </a:p>
+            </p:txBody>
+          </p:sp>
+          <p:sp>
+            <p:nvSpPr>
+              <p:cNvPr id="52" name="Elipse 51"/>
+              <p:cNvSpPr/>
+              <p:nvPr/>
+            </p:nvSpPr>
+            <p:spPr>
+              <a:xfrm>
+                <a:off x="6628661" y="2298053"/>
+                <a:ext cx="720517" cy="1059888"/>
+              </a:xfrm>
+              <a:prstGeom prst="ellipse">
+                <a:avLst/>
+              </a:prstGeom>
+              <a:solidFill>
+                <a:schemeClr val="accent1">
+                  <a:lumMod val="20000"/>
+                  <a:lumOff val="80000"/>
+                </a:schemeClr>
+              </a:solidFill>
+              <a:ln>
+                <a:noFill/>
+              </a:ln>
+            </p:spPr>
+            <p:style>
+              <a:lnRef idx="2">
+                <a:schemeClr val="accent1">
+                  <a:shade val="50000"/>
+                </a:schemeClr>
+              </a:lnRef>
+              <a:fillRef idx="1">
+                <a:schemeClr val="accent1"/>
+              </a:fillRef>
+              <a:effectRef idx="0">
+                <a:schemeClr val="accent1"/>
+              </a:effectRef>
+              <a:fontRef idx="minor">
+                <a:schemeClr val="lt1"/>
+              </a:fontRef>
+            </p:style>
+            <p:txBody>
+              <a:bodyPr rtlCol="0" anchor="ctr"/>
+              <a:lstStyle/>
+              <a:p>
+                <a:pPr algn="ctr"/>
+                <a:endParaRPr lang="pt-BR"/>
+              </a:p>
+            </p:txBody>
+          </p:sp>
+          <p:sp>
+            <p:nvSpPr>
+              <p:cNvPr id="53" name="Forma livre 52"/>
+              <p:cNvSpPr/>
+              <p:nvPr/>
+            </p:nvSpPr>
+            <p:spPr>
+              <a:xfrm>
+                <a:off x="6812707" y="2501900"/>
+                <a:ext cx="171972" cy="770848"/>
+              </a:xfrm>
+              <a:custGeom>
+                <a:avLst/>
+                <a:gdLst>
+                  <a:gd name="connsiteX0" fmla="*/ 0 w 171972"/>
+                  <a:gd name="connsiteY0" fmla="*/ 0 h 770848"/>
+                  <a:gd name="connsiteX1" fmla="*/ 171450 w 171972"/>
+                  <a:gd name="connsiteY1" fmla="*/ 317500 h 770848"/>
+                  <a:gd name="connsiteX2" fmla="*/ 57150 w 171972"/>
+                  <a:gd name="connsiteY2" fmla="*/ 628650 h 770848"/>
+                  <a:gd name="connsiteX3" fmla="*/ 171450 w 171972"/>
+                  <a:gd name="connsiteY3" fmla="*/ 768350 h 770848"/>
+                </a:gdLst>
+                <a:ahLst/>
+                <a:cxnLst>
+                  <a:cxn ang="0">
+                    <a:pos x="connsiteX0" y="connsiteY0"/>
+                  </a:cxn>
+                  <a:cxn ang="0">
+                    <a:pos x="connsiteX1" y="connsiteY1"/>
+                  </a:cxn>
+                  <a:cxn ang="0">
+                    <a:pos x="connsiteX2" y="connsiteY2"/>
+                  </a:cxn>
+                  <a:cxn ang="0">
+                    <a:pos x="connsiteX3" y="connsiteY3"/>
+                  </a:cxn>
+                </a:cxnLst>
+                <a:rect l="l" t="t" r="r" b="b"/>
+                <a:pathLst>
+                  <a:path w="171972" h="770848">
+                    <a:moveTo>
+                      <a:pt x="0" y="0"/>
+                    </a:moveTo>
+                    <a:cubicBezTo>
+                      <a:pt x="80962" y="106362"/>
+                      <a:pt x="161925" y="212725"/>
+                      <a:pt x="171450" y="317500"/>
+                    </a:cubicBezTo>
+                    <a:cubicBezTo>
+                      <a:pt x="180975" y="422275"/>
+                      <a:pt x="57150" y="553508"/>
+                      <a:pt x="57150" y="628650"/>
+                    </a:cubicBezTo>
+                    <a:cubicBezTo>
+                      <a:pt x="57150" y="703792"/>
+                      <a:pt x="150283" y="786342"/>
+                      <a:pt x="171450" y="768350"/>
+                    </a:cubicBezTo>
+                  </a:path>
+                </a:pathLst>
+              </a:custGeom>
+              <a:noFill/>
+              <a:ln w="38100"/>
+            </p:spPr>
+            <p:style>
+              <a:lnRef idx="2">
+                <a:schemeClr val="accent1">
+                  <a:shade val="50000"/>
+                </a:schemeClr>
+              </a:lnRef>
+              <a:fillRef idx="1">
+                <a:schemeClr val="accent1"/>
+              </a:fillRef>
+              <a:effectRef idx="0">
+                <a:schemeClr val="accent1"/>
+              </a:effectRef>
+              <a:fontRef idx="minor">
+                <a:schemeClr val="lt1"/>
+              </a:fontRef>
+            </p:style>
+            <p:txBody>
+              <a:bodyPr rtlCol="0" anchor="ctr"/>
+              <a:lstStyle/>
+              <a:p>
+                <a:pPr algn="ctr"/>
+                <a:endParaRPr lang="pt-BR"/>
+              </a:p>
+            </p:txBody>
+          </p:sp>
+          <p:sp>
+            <p:nvSpPr>
+              <p:cNvPr id="56" name="Forma livre 55"/>
+              <p:cNvSpPr/>
+              <p:nvPr/>
+            </p:nvSpPr>
+            <p:spPr>
+              <a:xfrm>
+                <a:off x="6993161" y="2442573"/>
+                <a:ext cx="171972" cy="770848"/>
+              </a:xfrm>
+              <a:custGeom>
+                <a:avLst/>
+                <a:gdLst>
+                  <a:gd name="connsiteX0" fmla="*/ 0 w 171972"/>
+                  <a:gd name="connsiteY0" fmla="*/ 0 h 770848"/>
+                  <a:gd name="connsiteX1" fmla="*/ 171450 w 171972"/>
+                  <a:gd name="connsiteY1" fmla="*/ 317500 h 770848"/>
+                  <a:gd name="connsiteX2" fmla="*/ 57150 w 171972"/>
+                  <a:gd name="connsiteY2" fmla="*/ 628650 h 770848"/>
+                  <a:gd name="connsiteX3" fmla="*/ 171450 w 171972"/>
+                  <a:gd name="connsiteY3" fmla="*/ 768350 h 770848"/>
+                </a:gdLst>
+                <a:ahLst/>
+                <a:cxnLst>
+                  <a:cxn ang="0">
+                    <a:pos x="connsiteX0" y="connsiteY0"/>
+                  </a:cxn>
+                  <a:cxn ang="0">
+                    <a:pos x="connsiteX1" y="connsiteY1"/>
+                  </a:cxn>
+                  <a:cxn ang="0">
+                    <a:pos x="connsiteX2" y="connsiteY2"/>
+                  </a:cxn>
+                  <a:cxn ang="0">
+                    <a:pos x="connsiteX3" y="connsiteY3"/>
+                  </a:cxn>
+                </a:cxnLst>
+                <a:rect l="l" t="t" r="r" b="b"/>
+                <a:pathLst>
+                  <a:path w="171972" h="770848">
+                    <a:moveTo>
+                      <a:pt x="0" y="0"/>
+                    </a:moveTo>
+                    <a:cubicBezTo>
+                      <a:pt x="80962" y="106362"/>
+                      <a:pt x="161925" y="212725"/>
+                      <a:pt x="171450" y="317500"/>
+                    </a:cubicBezTo>
+                    <a:cubicBezTo>
+                      <a:pt x="180975" y="422275"/>
+                      <a:pt x="57150" y="553508"/>
+                      <a:pt x="57150" y="628650"/>
+                    </a:cubicBezTo>
+                    <a:cubicBezTo>
+                      <a:pt x="57150" y="703792"/>
+                      <a:pt x="150283" y="786342"/>
+                      <a:pt x="171450" y="768350"/>
+                    </a:cubicBezTo>
+                  </a:path>
+                </a:pathLst>
+              </a:custGeom>
+              <a:noFill/>
+              <a:ln w="38100"/>
+            </p:spPr>
+            <p:style>
+              <a:lnRef idx="2">
+                <a:schemeClr val="accent1">
+                  <a:shade val="50000"/>
+                </a:schemeClr>
+              </a:lnRef>
+              <a:fillRef idx="1">
+                <a:schemeClr val="accent1"/>
+              </a:fillRef>
+              <a:effectRef idx="0">
+                <a:schemeClr val="accent1"/>
+              </a:effectRef>
+              <a:fontRef idx="minor">
+                <a:schemeClr val="lt1"/>
+              </a:fontRef>
+            </p:style>
+            <p:txBody>
+              <a:bodyPr rtlCol="0" anchor="ctr"/>
+              <a:lstStyle/>
+              <a:p>
+                <a:pPr algn="ctr"/>
+                <a:endParaRPr lang="pt-BR"/>
+              </a:p>
+            </p:txBody>
+          </p:sp>
+        </p:grpSp>
+        <p:sp>
+          <p:nvSpPr>
+            <p:cNvPr id="57" name="Elipse 56"/>
+            <p:cNvSpPr/>
+            <p:nvPr/>
+          </p:nvSpPr>
+          <p:spPr>
+            <a:xfrm>
+              <a:off x="6497209" y="2901950"/>
+              <a:ext cx="242265" cy="242265"/>
+            </a:xfrm>
+            <a:prstGeom prst="ellipse">
+              <a:avLst/>
+            </a:prstGeom>
+            <a:solidFill>
+              <a:srgbClr val="7030A0"/>
+            </a:solidFill>
+            <a:ln>
+              <a:noFill/>
+            </a:ln>
+          </p:spPr>
+          <p:style>
+            <a:lnRef idx="2">
+              <a:schemeClr val="accent1">
+                <a:shade val="50000"/>
+              </a:schemeClr>
+            </a:lnRef>
+            <a:fillRef idx="1">
+              <a:schemeClr val="accent1"/>
+            </a:fillRef>
+            <a:effectRef idx="0">
+              <a:schemeClr val="accent1"/>
+            </a:effectRef>
+            <a:fontRef idx="minor">
+              <a:schemeClr val="lt1"/>
+            </a:fontRef>
+          </p:style>
+          <p:txBody>
+            <a:bodyPr rtlCol="0" anchor="ctr"/>
+            <a:lstStyle/>
+            <a:p>
+              <a:pPr algn="ctr"/>
+              <a:endParaRPr lang="pt-BR"/>
+            </a:p>
+          </p:txBody>
+        </p:sp>
+        <p:sp>
+          <p:nvSpPr>
+            <p:cNvPr id="59" name="Elipse 58"/>
+            <p:cNvSpPr/>
+            <p:nvPr/>
+          </p:nvSpPr>
+          <p:spPr>
+            <a:xfrm>
+              <a:off x="6497209" y="2714314"/>
+              <a:ext cx="242265" cy="242265"/>
+            </a:xfrm>
+            <a:prstGeom prst="ellipse">
+              <a:avLst/>
+            </a:prstGeom>
+            <a:solidFill>
+              <a:srgbClr val="7030A0"/>
+            </a:solidFill>
+            <a:ln>
+              <a:noFill/>
+            </a:ln>
+          </p:spPr>
+          <p:style>
+            <a:lnRef idx="2">
+              <a:schemeClr val="accent1">
+                <a:shade val="50000"/>
+              </a:schemeClr>
+            </a:lnRef>
+            <a:fillRef idx="1">
+              <a:schemeClr val="accent1"/>
+            </a:fillRef>
+            <a:effectRef idx="0">
+              <a:schemeClr val="accent1"/>
+            </a:effectRef>
+            <a:fontRef idx="minor">
+              <a:schemeClr val="lt1"/>
+            </a:fontRef>
+          </p:style>
+          <p:txBody>
+            <a:bodyPr rtlCol="0" anchor="ctr"/>
+            <a:lstStyle/>
+            <a:p>
+              <a:pPr algn="ctr"/>
+              <a:endParaRPr lang="pt-BR"/>
+            </a:p>
+          </p:txBody>
+        </p:sp>
+        <p:sp>
+          <p:nvSpPr>
+            <p:cNvPr id="60" name="Elipse 59"/>
+            <p:cNvSpPr/>
+            <p:nvPr/>
+          </p:nvSpPr>
+          <p:spPr>
+            <a:xfrm rot="14470692">
+              <a:off x="6893646" y="3712980"/>
+              <a:ext cx="242265" cy="242265"/>
+            </a:xfrm>
+            <a:prstGeom prst="ellipse">
+              <a:avLst/>
+            </a:prstGeom>
+            <a:solidFill>
+              <a:srgbClr val="7030A0"/>
+            </a:solidFill>
+            <a:ln>
+              <a:noFill/>
+            </a:ln>
+          </p:spPr>
+          <p:style>
+            <a:lnRef idx="2">
+              <a:schemeClr val="accent1">
+                <a:shade val="50000"/>
+              </a:schemeClr>
+            </a:lnRef>
+            <a:fillRef idx="1">
+              <a:schemeClr val="accent1"/>
+            </a:fillRef>
+            <a:effectRef idx="0">
+              <a:schemeClr val="accent1"/>
+            </a:effectRef>
+            <a:fontRef idx="minor">
+              <a:schemeClr val="lt1"/>
+            </a:fontRef>
+          </p:style>
+          <p:txBody>
+            <a:bodyPr rtlCol="0" anchor="ctr"/>
+            <a:lstStyle/>
+            <a:p>
+              <a:pPr algn="ctr"/>
+              <a:endParaRPr lang="pt-BR"/>
+            </a:p>
+          </p:txBody>
+        </p:sp>
+        <p:sp>
+          <p:nvSpPr>
+            <p:cNvPr id="61" name="Elipse 60"/>
+            <p:cNvSpPr/>
+            <p:nvPr/>
+          </p:nvSpPr>
+          <p:spPr>
+            <a:xfrm rot="14470692">
+              <a:off x="6782865" y="3593595"/>
+              <a:ext cx="242265" cy="242265"/>
+            </a:xfrm>
+            <a:prstGeom prst="ellipse">
+              <a:avLst/>
+            </a:prstGeom>
+            <a:solidFill>
+              <a:srgbClr val="7030A0"/>
+            </a:solidFill>
+            <a:ln>
+              <a:noFill/>
+            </a:ln>
+          </p:spPr>
+          <p:style>
+            <a:lnRef idx="2">
+              <a:schemeClr val="accent1">
+                <a:shade val="50000"/>
+              </a:schemeClr>
+            </a:lnRef>
+            <a:fillRef idx="1">
+              <a:schemeClr val="accent1"/>
+            </a:fillRef>
+            <a:effectRef idx="0">
+              <a:schemeClr val="accent1"/>
+            </a:effectRef>
+            <a:fontRef idx="minor">
+              <a:schemeClr val="lt1"/>
+            </a:fontRef>
+          </p:style>
+          <p:txBody>
+            <a:bodyPr rtlCol="0" anchor="ctr"/>
+            <a:lstStyle/>
+            <a:p>
+              <a:pPr algn="ctr"/>
+              <a:endParaRPr lang="pt-BR"/>
+            </a:p>
+          </p:txBody>
+        </p:sp>
+        <p:sp>
+          <p:nvSpPr>
+            <p:cNvPr id="62" name="Elipse 61"/>
+            <p:cNvSpPr/>
+            <p:nvPr/>
+          </p:nvSpPr>
+          <p:spPr>
+            <a:xfrm>
+              <a:off x="6756745" y="2073306"/>
+              <a:ext cx="242265" cy="242265"/>
+            </a:xfrm>
+            <a:prstGeom prst="ellipse">
+              <a:avLst/>
+            </a:prstGeom>
+            <a:solidFill>
+              <a:srgbClr val="7030A0"/>
+            </a:solidFill>
+            <a:ln>
+              <a:noFill/>
+            </a:ln>
+          </p:spPr>
+          <p:style>
+            <a:lnRef idx="2">
+              <a:schemeClr val="accent1">
+                <a:shade val="50000"/>
+              </a:schemeClr>
+            </a:lnRef>
+            <a:fillRef idx="1">
+              <a:schemeClr val="accent1"/>
+            </a:fillRef>
+            <a:effectRef idx="0">
+              <a:schemeClr val="accent1"/>
+            </a:effectRef>
+            <a:fontRef idx="minor">
+              <a:schemeClr val="lt1"/>
+            </a:fontRef>
+          </p:style>
+          <p:txBody>
+            <a:bodyPr rtlCol="0" anchor="ctr"/>
+            <a:lstStyle/>
+            <a:p>
+              <a:pPr algn="ctr"/>
+              <a:endParaRPr lang="pt-BR"/>
+            </a:p>
+          </p:txBody>
+        </p:sp>
+        <p:sp>
+          <p:nvSpPr>
+            <p:cNvPr id="63" name="Elipse 62"/>
+            <p:cNvSpPr/>
+            <p:nvPr/>
+          </p:nvSpPr>
+          <p:spPr>
+            <a:xfrm>
+              <a:off x="6892891" y="1927577"/>
+              <a:ext cx="242265" cy="242265"/>
+            </a:xfrm>
+            <a:prstGeom prst="ellipse">
+              <a:avLst/>
+            </a:prstGeom>
+            <a:solidFill>
+              <a:srgbClr val="7030A0"/>
+            </a:solidFill>
+            <a:ln>
+              <a:noFill/>
+            </a:ln>
+          </p:spPr>
+          <p:style>
+            <a:lnRef idx="2">
+              <a:schemeClr val="accent1">
+                <a:shade val="50000"/>
+              </a:schemeClr>
+            </a:lnRef>
+            <a:fillRef idx="1">
+              <a:schemeClr val="accent1"/>
+            </a:fillRef>
+            <a:effectRef idx="0">
+              <a:schemeClr val="accent1"/>
+            </a:effectRef>
+            <a:fontRef idx="minor">
+              <a:schemeClr val="lt1"/>
+            </a:fontRef>
+          </p:style>
+          <p:txBody>
+            <a:bodyPr rtlCol="0" anchor="ctr"/>
+            <a:lstStyle/>
+            <a:p>
+              <a:pPr algn="ctr"/>
+              <a:endParaRPr lang="pt-BR"/>
+            </a:p>
+          </p:txBody>
+        </p:sp>
+        <p:sp>
+          <p:nvSpPr>
+            <p:cNvPr id="64" name="Elipse 63"/>
+            <p:cNvSpPr/>
+            <p:nvPr/>
+          </p:nvSpPr>
+          <p:spPr>
+            <a:xfrm>
+              <a:off x="7569793" y="1638481"/>
+              <a:ext cx="242265" cy="242265"/>
+            </a:xfrm>
+            <a:prstGeom prst="ellipse">
+              <a:avLst/>
+            </a:prstGeom>
+            <a:solidFill>
+              <a:srgbClr val="7030A0"/>
+            </a:solidFill>
+            <a:ln>
+              <a:noFill/>
+            </a:ln>
+          </p:spPr>
+          <p:style>
+            <a:lnRef idx="2">
+              <a:schemeClr val="accent1">
+                <a:shade val="50000"/>
+              </a:schemeClr>
+            </a:lnRef>
+            <a:fillRef idx="1">
+              <a:schemeClr val="accent1"/>
+            </a:fillRef>
+            <a:effectRef idx="0">
+              <a:schemeClr val="accent1"/>
+            </a:effectRef>
+            <a:fontRef idx="minor">
+              <a:schemeClr val="lt1"/>
+            </a:fontRef>
+          </p:style>
+          <p:txBody>
+            <a:bodyPr rtlCol="0" anchor="ctr"/>
+            <a:lstStyle/>
+            <a:p>
+              <a:pPr algn="ctr"/>
+              <a:endParaRPr lang="pt-BR"/>
+            </a:p>
+          </p:txBody>
+        </p:sp>
+        <p:sp>
+          <p:nvSpPr>
+            <p:cNvPr id="65" name="Elipse 64"/>
+            <p:cNvSpPr/>
+            <p:nvPr/>
+          </p:nvSpPr>
+          <p:spPr>
+            <a:xfrm>
+              <a:off x="7706246" y="1638482"/>
+              <a:ext cx="242265" cy="242265"/>
+            </a:xfrm>
+            <a:prstGeom prst="ellipse">
+              <a:avLst/>
+            </a:prstGeom>
+            <a:solidFill>
+              <a:srgbClr val="7030A0"/>
+            </a:solidFill>
+            <a:ln>
+              <a:noFill/>
+            </a:ln>
+          </p:spPr>
+          <p:style>
+            <a:lnRef idx="2">
+              <a:schemeClr val="accent1">
+                <a:shade val="50000"/>
+              </a:schemeClr>
+            </a:lnRef>
+            <a:fillRef idx="1">
+              <a:schemeClr val="accent1"/>
+            </a:fillRef>
+            <a:effectRef idx="0">
+              <a:schemeClr val="accent1"/>
+            </a:effectRef>
+            <a:fontRef idx="minor">
+              <a:schemeClr val="lt1"/>
+            </a:fontRef>
+          </p:style>
+          <p:txBody>
+            <a:bodyPr rtlCol="0" anchor="ctr"/>
+            <a:lstStyle/>
+            <a:p>
+              <a:pPr algn="ctr"/>
+              <a:endParaRPr lang="pt-BR"/>
+            </a:p>
+          </p:txBody>
+        </p:sp>
+        <p:sp>
+          <p:nvSpPr>
+            <p:cNvPr id="66" name="Elipse 65"/>
+            <p:cNvSpPr/>
+            <p:nvPr/>
+          </p:nvSpPr>
+          <p:spPr>
+            <a:xfrm>
+              <a:off x="8505507" y="2048708"/>
+              <a:ext cx="242265" cy="242265"/>
+            </a:xfrm>
+            <a:prstGeom prst="ellipse">
+              <a:avLst/>
+            </a:prstGeom>
+            <a:solidFill>
+              <a:srgbClr val="7030A0"/>
+            </a:solidFill>
+            <a:ln>
+              <a:noFill/>
+            </a:ln>
+          </p:spPr>
+          <p:style>
+            <a:lnRef idx="2">
+              <a:schemeClr val="accent1">
+                <a:shade val="50000"/>
+              </a:schemeClr>
+            </a:lnRef>
+            <a:fillRef idx="1">
+              <a:schemeClr val="accent1"/>
+            </a:fillRef>
+            <a:effectRef idx="0">
+              <a:schemeClr val="accent1"/>
+            </a:effectRef>
+            <a:fontRef idx="minor">
+              <a:schemeClr val="lt1"/>
+            </a:fontRef>
+          </p:style>
+          <p:txBody>
+            <a:bodyPr rtlCol="0" anchor="ctr"/>
+            <a:lstStyle/>
+            <a:p>
+              <a:pPr algn="ctr"/>
+              <a:endParaRPr lang="pt-BR"/>
+            </a:p>
+          </p:txBody>
+        </p:sp>
+        <p:sp>
+          <p:nvSpPr>
+            <p:cNvPr id="67" name="Elipse 66"/>
+            <p:cNvSpPr/>
+            <p:nvPr/>
+          </p:nvSpPr>
+          <p:spPr>
+            <a:xfrm>
+              <a:off x="8398593" y="1927576"/>
+              <a:ext cx="242265" cy="242265"/>
+            </a:xfrm>
+            <a:prstGeom prst="ellipse">
+              <a:avLst/>
+            </a:prstGeom>
+            <a:solidFill>
+              <a:srgbClr val="7030A0"/>
+            </a:solidFill>
+            <a:ln>
+              <a:noFill/>
+            </a:ln>
+          </p:spPr>
+          <p:style>
+            <a:lnRef idx="2">
+              <a:schemeClr val="accent1">
+                <a:shade val="50000"/>
+              </a:schemeClr>
+            </a:lnRef>
+            <a:fillRef idx="1">
+              <a:schemeClr val="accent1"/>
+            </a:fillRef>
+            <a:effectRef idx="0">
+              <a:schemeClr val="accent1"/>
+            </a:effectRef>
+            <a:fontRef idx="minor">
+              <a:schemeClr val="lt1"/>
+            </a:fontRef>
+          </p:style>
+          <p:txBody>
+            <a:bodyPr rtlCol="0" anchor="ctr"/>
+            <a:lstStyle/>
+            <a:p>
+              <a:pPr algn="ctr"/>
+              <a:endParaRPr lang="pt-BR"/>
+            </a:p>
+          </p:txBody>
+        </p:sp>
+        <p:sp>
+          <p:nvSpPr>
+            <p:cNvPr id="68" name="Elipse 67"/>
+            <p:cNvSpPr/>
+            <p:nvPr/>
+          </p:nvSpPr>
+          <p:spPr>
+            <a:xfrm>
+              <a:off x="8791461" y="2886783"/>
+              <a:ext cx="242265" cy="242265"/>
+            </a:xfrm>
+            <a:prstGeom prst="ellipse">
+              <a:avLst/>
+            </a:prstGeom>
+            <a:solidFill>
+              <a:srgbClr val="7030A0"/>
+            </a:solidFill>
+            <a:ln>
+              <a:noFill/>
+            </a:ln>
+          </p:spPr>
+          <p:style>
+            <a:lnRef idx="2">
+              <a:schemeClr val="accent1">
+                <a:shade val="50000"/>
+              </a:schemeClr>
+            </a:lnRef>
+            <a:fillRef idx="1">
+              <a:schemeClr val="accent1"/>
+            </a:fillRef>
+            <a:effectRef idx="0">
+              <a:schemeClr val="accent1"/>
+            </a:effectRef>
+            <a:fontRef idx="minor">
+              <a:schemeClr val="lt1"/>
+            </a:fontRef>
+          </p:style>
+          <p:txBody>
+            <a:bodyPr rtlCol="0" anchor="ctr"/>
+            <a:lstStyle/>
+            <a:p>
+              <a:pPr algn="ctr"/>
+              <a:endParaRPr lang="pt-BR"/>
+            </a:p>
+          </p:txBody>
+        </p:sp>
+        <p:sp>
+          <p:nvSpPr>
+            <p:cNvPr id="69" name="Elipse 68"/>
+            <p:cNvSpPr/>
+            <p:nvPr/>
+          </p:nvSpPr>
+          <p:spPr>
+            <a:xfrm>
+              <a:off x="8791461" y="2699147"/>
+              <a:ext cx="242265" cy="242265"/>
+            </a:xfrm>
+            <a:prstGeom prst="ellipse">
+              <a:avLst/>
+            </a:prstGeom>
+            <a:solidFill>
+              <a:srgbClr val="7030A0"/>
+            </a:solidFill>
+            <a:ln>
+              <a:noFill/>
+            </a:ln>
+          </p:spPr>
+          <p:style>
+            <a:lnRef idx="2">
+              <a:schemeClr val="accent1">
+                <a:shade val="50000"/>
+              </a:schemeClr>
+            </a:lnRef>
+            <a:fillRef idx="1">
+              <a:schemeClr val="accent1"/>
+            </a:fillRef>
+            <a:effectRef idx="0">
+              <a:schemeClr val="accent1"/>
+            </a:effectRef>
+            <a:fontRef idx="minor">
+              <a:schemeClr val="lt1"/>
+            </a:fontRef>
+          </p:style>
+          <p:txBody>
+            <a:bodyPr rtlCol="0" anchor="ctr"/>
+            <a:lstStyle/>
+            <a:p>
+              <a:pPr algn="ctr"/>
+              <a:endParaRPr lang="pt-BR"/>
+            </a:p>
+          </p:txBody>
+        </p:sp>
+        <p:sp>
+          <p:nvSpPr>
+            <p:cNvPr id="70" name="Elipse 69"/>
+            <p:cNvSpPr/>
+            <p:nvPr/>
+          </p:nvSpPr>
+          <p:spPr>
+            <a:xfrm>
+              <a:off x="7706245" y="3992538"/>
+              <a:ext cx="242265" cy="242265"/>
+            </a:xfrm>
+            <a:prstGeom prst="ellipse">
+              <a:avLst/>
+            </a:prstGeom>
+            <a:solidFill>
+              <a:srgbClr val="7030A0"/>
+            </a:solidFill>
+            <a:ln>
+              <a:noFill/>
+            </a:ln>
+          </p:spPr>
+          <p:style>
+            <a:lnRef idx="2">
+              <a:schemeClr val="accent1">
+                <a:shade val="50000"/>
+              </a:schemeClr>
+            </a:lnRef>
+            <a:fillRef idx="1">
+              <a:schemeClr val="accent1"/>
+            </a:fillRef>
+            <a:effectRef idx="0">
+              <a:schemeClr val="accent1"/>
+            </a:effectRef>
+            <a:fontRef idx="minor">
+              <a:schemeClr val="lt1"/>
+            </a:fontRef>
+          </p:style>
+          <p:txBody>
+            <a:bodyPr rtlCol="0" anchor="ctr"/>
+            <a:lstStyle/>
+            <a:p>
+              <a:pPr algn="ctr"/>
+              <a:endParaRPr lang="pt-BR"/>
+            </a:p>
+          </p:txBody>
+        </p:sp>
+        <p:sp>
+          <p:nvSpPr>
+            <p:cNvPr id="71" name="Elipse 70"/>
+            <p:cNvSpPr/>
+            <p:nvPr/>
+          </p:nvSpPr>
+          <p:spPr>
+            <a:xfrm>
+              <a:off x="7569792" y="3992539"/>
+              <a:ext cx="242265" cy="242265"/>
+            </a:xfrm>
+            <a:prstGeom prst="ellipse">
+              <a:avLst/>
+            </a:prstGeom>
+            <a:solidFill>
+              <a:srgbClr val="7030A0"/>
+            </a:solidFill>
+            <a:ln>
+              <a:noFill/>
+            </a:ln>
+          </p:spPr>
+          <p:style>
+            <a:lnRef idx="2">
+              <a:schemeClr val="accent1">
+                <a:shade val="50000"/>
+              </a:schemeClr>
+            </a:lnRef>
+            <a:fillRef idx="1">
+              <a:schemeClr val="accent1"/>
+            </a:fillRef>
+            <a:effectRef idx="0">
+              <a:schemeClr val="accent1"/>
+            </a:effectRef>
+            <a:fontRef idx="minor">
+              <a:schemeClr val="lt1"/>
+            </a:fontRef>
+          </p:style>
+          <p:txBody>
+            <a:bodyPr rtlCol="0" anchor="ctr"/>
+            <a:lstStyle/>
+            <a:p>
+              <a:pPr algn="ctr"/>
+              <a:endParaRPr lang="pt-BR"/>
+            </a:p>
+          </p:txBody>
+        </p:sp>
+        <p:sp>
+          <p:nvSpPr>
+            <p:cNvPr id="72" name="Elipse 71"/>
+            <p:cNvSpPr/>
+            <p:nvPr/>
+          </p:nvSpPr>
+          <p:spPr>
+            <a:xfrm>
+              <a:off x="8428063" y="3683641"/>
+              <a:ext cx="242265" cy="242265"/>
+            </a:xfrm>
+            <a:prstGeom prst="ellipse">
+              <a:avLst/>
+            </a:prstGeom>
+            <a:solidFill>
+              <a:srgbClr val="7030A0"/>
+            </a:solidFill>
+            <a:ln>
+              <a:noFill/>
+            </a:ln>
+          </p:spPr>
+          <p:style>
+            <a:lnRef idx="2">
+              <a:schemeClr val="accent1">
+                <a:shade val="50000"/>
+              </a:schemeClr>
+            </a:lnRef>
+            <a:fillRef idx="1">
+              <a:schemeClr val="accent1"/>
+            </a:fillRef>
+            <a:effectRef idx="0">
+              <a:schemeClr val="accent1"/>
+            </a:effectRef>
+            <a:fontRef idx="minor">
+              <a:schemeClr val="lt1"/>
+            </a:fontRef>
+          </p:style>
+          <p:txBody>
+            <a:bodyPr rtlCol="0" anchor="ctr"/>
+            <a:lstStyle/>
+            <a:p>
+              <a:pPr algn="ctr"/>
+              <a:endParaRPr lang="pt-BR"/>
+            </a:p>
+          </p:txBody>
+        </p:sp>
+        <p:sp>
+          <p:nvSpPr>
+            <p:cNvPr id="73" name="Elipse 72"/>
+            <p:cNvSpPr/>
+            <p:nvPr/>
+          </p:nvSpPr>
+          <p:spPr>
+            <a:xfrm>
+              <a:off x="8531196" y="3579909"/>
+              <a:ext cx="242265" cy="242265"/>
+            </a:xfrm>
+            <a:prstGeom prst="ellipse">
+              <a:avLst/>
+            </a:prstGeom>
+            <a:solidFill>
+              <a:srgbClr val="7030A0"/>
+            </a:solidFill>
+            <a:ln>
+              <a:noFill/>
+            </a:ln>
+          </p:spPr>
+          <p:style>
+            <a:lnRef idx="2">
+              <a:schemeClr val="accent1">
+                <a:shade val="50000"/>
+              </a:schemeClr>
+            </a:lnRef>
+            <a:fillRef idx="1">
+              <a:schemeClr val="accent1"/>
+            </a:fillRef>
+            <a:effectRef idx="0">
+              <a:schemeClr val="accent1"/>
+            </a:effectRef>
+            <a:fontRef idx="minor">
+              <a:schemeClr val="lt1"/>
+            </a:fontRef>
+          </p:style>
+          <p:txBody>
+            <a:bodyPr rtlCol="0" anchor="ctr"/>
+            <a:lstStyle/>
+            <a:p>
+              <a:pPr algn="ctr"/>
+              <a:endParaRPr lang="pt-BR"/>
+            </a:p>
+          </p:txBody>
+        </p:sp>
+      </p:grpSp>
     </p:spTree>
     <p:extLst>
       <p:ext uri="{BB962C8B-B14F-4D97-AF65-F5344CB8AC3E}">
@@ -3609,12 +5113,15 @@
         </p:nvSpPr>
         <p:spPr>
           <a:xfrm>
-            <a:off x="6172200" y="3009900"/>
+            <a:off x="1457325" y="5762625"/>
             <a:ext cx="2095500" cy="447675"/>
           </a:xfrm>
           <a:prstGeom prst="flowChartAlternateProcess">
             <a:avLst/>
           </a:prstGeom>
+          <a:solidFill>
+            <a:srgbClr val="DFC4EE"/>
+          </a:solidFill>
         </p:spPr>
         <p:style>
           <a:lnRef idx="2">
@@ -3652,7 +5159,7 @@
         </p:nvCxnSpPr>
         <p:spPr>
           <a:xfrm>
-            <a:off x="7219950" y="3009900"/>
+            <a:off x="2505075" y="5762625"/>
             <a:ext cx="0" cy="447675"/>
           </a:xfrm>
           <a:prstGeom prst="line">
@@ -3682,7 +5189,7 @@
         </p:nvCxnSpPr>
         <p:spPr>
           <a:xfrm flipV="1">
-            <a:off x="7038975" y="3052762"/>
+            <a:off x="2324100" y="5805487"/>
             <a:ext cx="361950" cy="361950"/>
           </a:xfrm>
           <a:prstGeom prst="line">
@@ -3717,7 +5224,7 @@
         </p:nvCxnSpPr>
         <p:spPr>
           <a:xfrm rot="16200000" flipV="1">
-            <a:off x="7038975" y="3052762"/>
+            <a:off x="2324100" y="5805487"/>
             <a:ext cx="361950" cy="361950"/>
           </a:xfrm>
           <a:prstGeom prst="line">
@@ -3752,7 +5259,7 @@
         </p:nvSpPr>
         <p:spPr>
           <a:xfrm>
-            <a:off x="6399345" y="3078718"/>
+            <a:off x="1684470" y="5831443"/>
             <a:ext cx="614271" cy="646331"/>
           </a:xfrm>
           <a:prstGeom prst="rect">
@@ -3785,7 +5292,7 @@
         </p:nvSpPr>
         <p:spPr>
           <a:xfrm>
-            <a:off x="7562850" y="3078718"/>
+            <a:off x="2847975" y="5831443"/>
             <a:ext cx="534121" cy="369332"/>
           </a:xfrm>
           <a:prstGeom prst="rect">
@@ -4082,7 +5589,7 @@
   <a:extraClrSchemeLst/>
   <a:extLst>
     <a:ext uri="{05A4C25C-085E-4340-85A3-A5531E510DB2}">
-      <thm15:themeFamily xmlns="" xmlns:thm15="http://schemas.microsoft.com/office/thememl/2012/main" name="Office Theme" id="{62F939B6-93AF-4DB8-9C6B-D6C7DFDC589F}" vid="{4A3C46E8-61CC-4603-A589-7422A47A8E4A}"/>
+      <thm15:themeFamily xmlns:thm15="http://schemas.microsoft.com/office/thememl/2012/main" xmlns="" name="Office Theme" id="{62F939B6-93AF-4DB8-9C6B-D6C7DFDC589F}" vid="{4A3C46E8-61CC-4603-A589-7422A47A8E4A}"/>
     </a:ext>
   </a:extLst>
 </a:theme>

</xml_diff>